<commit_message>
Fixed bugs so the protocol can run.
Also started updating the image system - incomplete.
</commit_message>
<xml_diff>
--- a/docs/mainz.med.precode.pressure.v1/VisualStimuli.pptx
+++ b/docs/mainz.med.precode.pressure.v1/VisualStimuli.pptx
@@ -1146,7 +1146,7 @@
           <a:p>
             <a:fld id="{5DDC2AD2-AF99-47A6-A968-A5E9DAC693F2}" type="datetimeFigureOut">
               <a:rPr lang="en-DK" smtClean="0"/>
-              <a:t>14/04/2024</a:t>
+              <a:t>16/04/2025</a:t>
             </a:fld>
             <a:endParaRPr lang="en-DK"/>
           </a:p>
@@ -1460,7 +1460,7 @@
           <a:p>
             <a:r>
               <a:rPr lang="en-GB" dirty="0"/>
-              <a:t>BLANK</a:t>
+              <a:t>Blank</a:t>
             </a:r>
             <a:endParaRPr lang="en-DK" dirty="0"/>
           </a:p>
@@ -2427,8 +2427,8 @@
           <a:lstStyle/>
           <a:p>
             <a:r>
-              <a:rPr lang="en-GB" dirty="0"/>
-              <a:t>BLANK WITH FIDUCIAL MARKER</a:t>
+              <a:rPr lang="en-GB" dirty="0" err="1"/>
+              <a:t>BlankWithFiducial</a:t>
             </a:r>
             <a:endParaRPr lang="en-DK" dirty="0"/>
           </a:p>
@@ -3044,7 +3044,7 @@
           <a:p>
             <a:r>
               <a:rPr lang="en-GB" dirty="0"/>
-              <a:t>LOW 27</a:t>
+              <a:t>Low27</a:t>
             </a:r>
             <a:endParaRPr lang="en-DK" dirty="0"/>
           </a:p>
@@ -3763,7 +3763,7 @@
           <a:p>
             <a:fld id="{B3C54930-DF73-4683-BEE7-FFCD5ED63EE6}" type="datetimeFigureOut">
               <a:rPr lang="en-DK" smtClean="0"/>
-              <a:t>14/04/2024</a:t>
+              <a:t>16/04/2025</a:t>
             </a:fld>
             <a:endParaRPr lang="en-DK"/>
           </a:p>
@@ -3963,7 +3963,7 @@
           <a:p>
             <a:fld id="{B3C54930-DF73-4683-BEE7-FFCD5ED63EE6}" type="datetimeFigureOut">
               <a:rPr lang="en-DK" smtClean="0"/>
-              <a:t>14/04/2024</a:t>
+              <a:t>16/04/2025</a:t>
             </a:fld>
             <a:endParaRPr lang="en-DK"/>
           </a:p>
@@ -4173,7 +4173,7 @@
           <a:p>
             <a:fld id="{B3C54930-DF73-4683-BEE7-FFCD5ED63EE6}" type="datetimeFigureOut">
               <a:rPr lang="en-DK" smtClean="0"/>
-              <a:t>14/04/2024</a:t>
+              <a:t>16/04/2025</a:t>
             </a:fld>
             <a:endParaRPr lang="en-DK"/>
           </a:p>
@@ -4373,7 +4373,7 @@
           <a:p>
             <a:fld id="{B3C54930-DF73-4683-BEE7-FFCD5ED63EE6}" type="datetimeFigureOut">
               <a:rPr lang="en-DK" smtClean="0"/>
-              <a:t>14/04/2024</a:t>
+              <a:t>16/04/2025</a:t>
             </a:fld>
             <a:endParaRPr lang="en-DK"/>
           </a:p>
@@ -4649,7 +4649,7 @@
           <a:p>
             <a:fld id="{B3C54930-DF73-4683-BEE7-FFCD5ED63EE6}" type="datetimeFigureOut">
               <a:rPr lang="en-DK" smtClean="0"/>
-              <a:t>14/04/2024</a:t>
+              <a:t>16/04/2025</a:t>
             </a:fld>
             <a:endParaRPr lang="en-DK"/>
           </a:p>
@@ -4917,7 +4917,7 @@
           <a:p>
             <a:fld id="{B3C54930-DF73-4683-BEE7-FFCD5ED63EE6}" type="datetimeFigureOut">
               <a:rPr lang="en-DK" smtClean="0"/>
-              <a:t>14/04/2024</a:t>
+              <a:t>16/04/2025</a:t>
             </a:fld>
             <a:endParaRPr lang="en-DK"/>
           </a:p>
@@ -5332,7 +5332,7 @@
           <a:p>
             <a:fld id="{B3C54930-DF73-4683-BEE7-FFCD5ED63EE6}" type="datetimeFigureOut">
               <a:rPr lang="en-DK" smtClean="0"/>
-              <a:t>14/04/2024</a:t>
+              <a:t>16/04/2025</a:t>
             </a:fld>
             <a:endParaRPr lang="en-DK"/>
           </a:p>
@@ -5474,7 +5474,7 @@
           <a:p>
             <a:fld id="{B3C54930-DF73-4683-BEE7-FFCD5ED63EE6}" type="datetimeFigureOut">
               <a:rPr lang="en-DK" smtClean="0"/>
-              <a:t>14/04/2024</a:t>
+              <a:t>16/04/2025</a:t>
             </a:fld>
             <a:endParaRPr lang="en-DK"/>
           </a:p>
@@ -5587,7 +5587,7 @@
           <a:p>
             <a:fld id="{B3C54930-DF73-4683-BEE7-FFCD5ED63EE6}" type="datetimeFigureOut">
               <a:rPr lang="en-DK" smtClean="0"/>
-              <a:t>14/04/2024</a:t>
+              <a:t>16/04/2025</a:t>
             </a:fld>
             <a:endParaRPr lang="en-DK"/>
           </a:p>
@@ -5900,7 +5900,7 @@
           <a:p>
             <a:fld id="{B3C54930-DF73-4683-BEE7-FFCD5ED63EE6}" type="datetimeFigureOut">
               <a:rPr lang="en-DK" smtClean="0"/>
-              <a:t>14/04/2024</a:t>
+              <a:t>16/04/2025</a:t>
             </a:fld>
             <a:endParaRPr lang="en-DK"/>
           </a:p>
@@ -6189,7 +6189,7 @@
           <a:p>
             <a:fld id="{B3C54930-DF73-4683-BEE7-FFCD5ED63EE6}" type="datetimeFigureOut">
               <a:rPr lang="en-DK" smtClean="0"/>
-              <a:t>14/04/2024</a:t>
+              <a:t>16/04/2025</a:t>
             </a:fld>
             <a:endParaRPr lang="en-DK"/>
           </a:p>
@@ -6432,7 +6432,7 @@
           <a:p>
             <a:fld id="{B3C54930-DF73-4683-BEE7-FFCD5ED63EE6}" type="datetimeFigureOut">
               <a:rPr lang="en-DK" smtClean="0"/>
-              <a:t>14/04/2024</a:t>
+              <a:t>16/04/2025</a:t>
             </a:fld>
             <a:endParaRPr lang="en-DK"/>
           </a:p>
@@ -7095,60 +7095,6 @@
           </a:p>
         </p:txBody>
       </p:sp>
-      <p:sp>
-        <p:nvSpPr>
-          <p:cNvPr id="2" name="Rectangle 1">
-            <a:extLst>
-              <a:ext uri="{FF2B5EF4-FFF2-40B4-BE49-F238E27FC236}">
-                <a16:creationId xmlns:a16="http://schemas.microsoft.com/office/drawing/2014/main" id="{0715CDB6-56EA-7DB5-B3A3-9068961D9384}"/>
-              </a:ext>
-            </a:extLst>
-          </p:cNvPr>
-          <p:cNvSpPr/>
-          <p:nvPr/>
-        </p:nvSpPr>
-        <p:spPr>
-          <a:xfrm>
-            <a:off x="11645463" y="177351"/>
-            <a:ext cx="360000" cy="360000"/>
-          </a:xfrm>
-          <a:prstGeom prst="rect">
-            <a:avLst/>
-          </a:prstGeom>
-          <a:solidFill>
-            <a:schemeClr val="bg1"/>
-          </a:solidFill>
-          <a:ln>
-            <a:solidFill>
-              <a:schemeClr val="bg1"/>
-            </a:solidFill>
-          </a:ln>
-        </p:spPr>
-        <p:style>
-          <a:lnRef idx="2">
-            <a:schemeClr val="accent1">
-              <a:shade val="15000"/>
-            </a:schemeClr>
-          </a:lnRef>
-          <a:fillRef idx="1">
-            <a:schemeClr val="accent1"/>
-          </a:fillRef>
-          <a:effectRef idx="0">
-            <a:schemeClr val="accent1"/>
-          </a:effectRef>
-          <a:fontRef idx="minor">
-            <a:schemeClr val="lt1"/>
-          </a:fontRef>
-        </p:style>
-        <p:txBody>
-          <a:bodyPr rtlCol="0" anchor="ctr"/>
-          <a:lstStyle/>
-          <a:p>
-            <a:pPr algn="ctr"/>
-            <a:endParaRPr lang="en-DK"/>
-          </a:p>
-        </p:txBody>
-      </p:sp>
       <p:pic>
         <p:nvPicPr>
           <p:cNvPr id="5" name="Picture 4" descr="A red and blue arrow with a blue arrow pointing at the top&#10;&#10;Description automatically generated">
@@ -7322,60 +7268,6 @@
           </a:p>
         </p:txBody>
       </p:sp>
-      <p:sp>
-        <p:nvSpPr>
-          <p:cNvPr id="2" name="Rectangle 1">
-            <a:extLst>
-              <a:ext uri="{FF2B5EF4-FFF2-40B4-BE49-F238E27FC236}">
-                <a16:creationId xmlns:a16="http://schemas.microsoft.com/office/drawing/2014/main" id="{0715CDB6-56EA-7DB5-B3A3-9068961D9384}"/>
-              </a:ext>
-            </a:extLst>
-          </p:cNvPr>
-          <p:cNvSpPr/>
-          <p:nvPr/>
-        </p:nvSpPr>
-        <p:spPr>
-          <a:xfrm>
-            <a:off x="11645463" y="177351"/>
-            <a:ext cx="360000" cy="360000"/>
-          </a:xfrm>
-          <a:prstGeom prst="rect">
-            <a:avLst/>
-          </a:prstGeom>
-          <a:solidFill>
-            <a:schemeClr val="bg1"/>
-          </a:solidFill>
-          <a:ln>
-            <a:solidFill>
-              <a:schemeClr val="bg1"/>
-            </a:solidFill>
-          </a:ln>
-        </p:spPr>
-        <p:style>
-          <a:lnRef idx="2">
-            <a:schemeClr val="accent1">
-              <a:shade val="15000"/>
-            </a:schemeClr>
-          </a:lnRef>
-          <a:fillRef idx="1">
-            <a:schemeClr val="accent1"/>
-          </a:fillRef>
-          <a:effectRef idx="0">
-            <a:schemeClr val="accent1"/>
-          </a:effectRef>
-          <a:fontRef idx="minor">
-            <a:schemeClr val="lt1"/>
-          </a:fontRef>
-        </p:style>
-        <p:txBody>
-          <a:bodyPr rtlCol="0" anchor="ctr"/>
-          <a:lstStyle/>
-          <a:p>
-            <a:pPr algn="ctr"/>
-            <a:endParaRPr lang="en-DK"/>
-          </a:p>
-        </p:txBody>
-      </p:sp>
       <p:pic>
         <p:nvPicPr>
           <p:cNvPr id="5" name="Picture 4" descr="A red and blue arrow with a blue arrow pointing at the end&#10;&#10;Description automatically generated">
@@ -7546,60 +7438,6 @@
           <a:p>
             <a:pPr algn="ctr"/>
             <a:endParaRPr lang="en-DK" dirty="0"/>
-          </a:p>
-        </p:txBody>
-      </p:sp>
-      <p:sp>
-        <p:nvSpPr>
-          <p:cNvPr id="2" name="Rectangle 1">
-            <a:extLst>
-              <a:ext uri="{FF2B5EF4-FFF2-40B4-BE49-F238E27FC236}">
-                <a16:creationId xmlns:a16="http://schemas.microsoft.com/office/drawing/2014/main" id="{0715CDB6-56EA-7DB5-B3A3-9068961D9384}"/>
-              </a:ext>
-            </a:extLst>
-          </p:cNvPr>
-          <p:cNvSpPr/>
-          <p:nvPr/>
-        </p:nvSpPr>
-        <p:spPr>
-          <a:xfrm>
-            <a:off x="11645463" y="177351"/>
-            <a:ext cx="360000" cy="360000"/>
-          </a:xfrm>
-          <a:prstGeom prst="rect">
-            <a:avLst/>
-          </a:prstGeom>
-          <a:solidFill>
-            <a:schemeClr val="bg1"/>
-          </a:solidFill>
-          <a:ln>
-            <a:solidFill>
-              <a:schemeClr val="bg1"/>
-            </a:solidFill>
-          </a:ln>
-        </p:spPr>
-        <p:style>
-          <a:lnRef idx="2">
-            <a:schemeClr val="accent1">
-              <a:shade val="15000"/>
-            </a:schemeClr>
-          </a:lnRef>
-          <a:fillRef idx="1">
-            <a:schemeClr val="accent1"/>
-          </a:fillRef>
-          <a:effectRef idx="0">
-            <a:schemeClr val="accent1"/>
-          </a:effectRef>
-          <a:fontRef idx="minor">
-            <a:schemeClr val="lt1"/>
-          </a:fontRef>
-        </p:style>
-        <p:txBody>
-          <a:bodyPr rtlCol="0" anchor="ctr"/>
-          <a:lstStyle/>
-          <a:p>
-            <a:pPr algn="ctr"/>
-            <a:endParaRPr lang="en-DK"/>
           </a:p>
         </p:txBody>
       </p:sp>
@@ -10829,60 +10667,6 @@
           </a:p>
         </p:txBody>
       </p:sp>
-      <p:sp>
-        <p:nvSpPr>
-          <p:cNvPr id="2" name="Rectangle 1">
-            <a:extLst>
-              <a:ext uri="{FF2B5EF4-FFF2-40B4-BE49-F238E27FC236}">
-                <a16:creationId xmlns:a16="http://schemas.microsoft.com/office/drawing/2014/main" id="{0715CDB6-56EA-7DB5-B3A3-9068961D9384}"/>
-              </a:ext>
-            </a:extLst>
-          </p:cNvPr>
-          <p:cNvSpPr/>
-          <p:nvPr/>
-        </p:nvSpPr>
-        <p:spPr>
-          <a:xfrm>
-            <a:off x="11645463" y="177351"/>
-            <a:ext cx="360000" cy="360000"/>
-          </a:xfrm>
-          <a:prstGeom prst="rect">
-            <a:avLst/>
-          </a:prstGeom>
-          <a:solidFill>
-            <a:schemeClr val="bg1"/>
-          </a:solidFill>
-          <a:ln>
-            <a:solidFill>
-              <a:schemeClr val="bg1"/>
-            </a:solidFill>
-          </a:ln>
-        </p:spPr>
-        <p:style>
-          <a:lnRef idx="2">
-            <a:schemeClr val="accent1">
-              <a:shade val="15000"/>
-            </a:schemeClr>
-          </a:lnRef>
-          <a:fillRef idx="1">
-            <a:schemeClr val="accent1"/>
-          </a:fillRef>
-          <a:effectRef idx="0">
-            <a:schemeClr val="accent1"/>
-          </a:effectRef>
-          <a:fontRef idx="minor">
-            <a:schemeClr val="lt1"/>
-          </a:fontRef>
-        </p:style>
-        <p:txBody>
-          <a:bodyPr rtlCol="0" anchor="ctr"/>
-          <a:lstStyle/>
-          <a:p>
-            <a:pPr algn="ctr"/>
-            <a:endParaRPr lang="en-DK"/>
-          </a:p>
-        </p:txBody>
-      </p:sp>
     </p:spTree>
     <p:extLst>
       <p:ext uri="{BB962C8B-B14F-4D97-AF65-F5344CB8AC3E}">
@@ -11079,60 +10863,6 @@
           </a:p>
         </p:txBody>
       </p:sp>
-      <p:sp>
-        <p:nvSpPr>
-          <p:cNvPr id="3" name="Rectangle 2">
-            <a:extLst>
-              <a:ext uri="{FF2B5EF4-FFF2-40B4-BE49-F238E27FC236}">
-                <a16:creationId xmlns:a16="http://schemas.microsoft.com/office/drawing/2014/main" id="{4E7D4095-8D73-1D6D-0A4F-390B68FA2BFE}"/>
-              </a:ext>
-            </a:extLst>
-          </p:cNvPr>
-          <p:cNvSpPr/>
-          <p:nvPr/>
-        </p:nvSpPr>
-        <p:spPr>
-          <a:xfrm>
-            <a:off x="11645463" y="177351"/>
-            <a:ext cx="360000" cy="360000"/>
-          </a:xfrm>
-          <a:prstGeom prst="rect">
-            <a:avLst/>
-          </a:prstGeom>
-          <a:solidFill>
-            <a:schemeClr val="bg1"/>
-          </a:solidFill>
-          <a:ln>
-            <a:solidFill>
-              <a:schemeClr val="bg1"/>
-            </a:solidFill>
-          </a:ln>
-        </p:spPr>
-        <p:style>
-          <a:lnRef idx="2">
-            <a:schemeClr val="accent1">
-              <a:shade val="15000"/>
-            </a:schemeClr>
-          </a:lnRef>
-          <a:fillRef idx="1">
-            <a:schemeClr val="accent1"/>
-          </a:fillRef>
-          <a:effectRef idx="0">
-            <a:schemeClr val="accent1"/>
-          </a:effectRef>
-          <a:fontRef idx="minor">
-            <a:schemeClr val="lt1"/>
-          </a:fontRef>
-        </p:style>
-        <p:txBody>
-          <a:bodyPr rtlCol="0" anchor="ctr"/>
-          <a:lstStyle/>
-          <a:p>
-            <a:pPr algn="ctr"/>
-            <a:endParaRPr lang="en-DK"/>
-          </a:p>
-        </p:txBody>
-      </p:sp>
     </p:spTree>
     <p:extLst>
       <p:ext uri="{BB962C8B-B14F-4D97-AF65-F5344CB8AC3E}">
@@ -11502,60 +11232,6 @@
           </a:prstGeom>
         </p:spPr>
       </p:pic>
-      <p:sp>
-        <p:nvSpPr>
-          <p:cNvPr id="6" name="Rectangle 5">
-            <a:extLst>
-              <a:ext uri="{FF2B5EF4-FFF2-40B4-BE49-F238E27FC236}">
-                <a16:creationId xmlns:a16="http://schemas.microsoft.com/office/drawing/2014/main" id="{C160B36D-65F3-B5E7-9C6C-C5F9B3888857}"/>
-              </a:ext>
-            </a:extLst>
-          </p:cNvPr>
-          <p:cNvSpPr/>
-          <p:nvPr/>
-        </p:nvSpPr>
-        <p:spPr>
-          <a:xfrm>
-            <a:off x="11645463" y="177351"/>
-            <a:ext cx="360000" cy="360000"/>
-          </a:xfrm>
-          <a:prstGeom prst="rect">
-            <a:avLst/>
-          </a:prstGeom>
-          <a:solidFill>
-            <a:schemeClr val="bg1"/>
-          </a:solidFill>
-          <a:ln>
-            <a:solidFill>
-              <a:schemeClr val="bg1"/>
-            </a:solidFill>
-          </a:ln>
-        </p:spPr>
-        <p:style>
-          <a:lnRef idx="2">
-            <a:schemeClr val="accent1">
-              <a:shade val="15000"/>
-            </a:schemeClr>
-          </a:lnRef>
-          <a:fillRef idx="1">
-            <a:schemeClr val="accent1"/>
-          </a:fillRef>
-          <a:effectRef idx="0">
-            <a:schemeClr val="accent1"/>
-          </a:effectRef>
-          <a:fontRef idx="minor">
-            <a:schemeClr val="lt1"/>
-          </a:fontRef>
-        </p:style>
-        <p:txBody>
-          <a:bodyPr rtlCol="0" anchor="ctr"/>
-          <a:lstStyle/>
-          <a:p>
-            <a:pPr algn="ctr"/>
-            <a:endParaRPr lang="en-DK"/>
-          </a:p>
-        </p:txBody>
-      </p:sp>
     </p:spTree>
     <p:extLst>
       <p:ext uri="{BB962C8B-B14F-4D97-AF65-F5344CB8AC3E}">
@@ -11729,60 +11405,6 @@
           </a:prstGeom>
         </p:spPr>
       </p:pic>
-      <p:sp>
-        <p:nvSpPr>
-          <p:cNvPr id="6" name="Rectangle 5">
-            <a:extLst>
-              <a:ext uri="{FF2B5EF4-FFF2-40B4-BE49-F238E27FC236}">
-                <a16:creationId xmlns:a16="http://schemas.microsoft.com/office/drawing/2014/main" id="{016D5F5E-7891-C68B-C57C-08D4E5D01868}"/>
-              </a:ext>
-            </a:extLst>
-          </p:cNvPr>
-          <p:cNvSpPr/>
-          <p:nvPr/>
-        </p:nvSpPr>
-        <p:spPr>
-          <a:xfrm>
-            <a:off x="11645463" y="177351"/>
-            <a:ext cx="360000" cy="360000"/>
-          </a:xfrm>
-          <a:prstGeom prst="rect">
-            <a:avLst/>
-          </a:prstGeom>
-          <a:solidFill>
-            <a:schemeClr val="bg1"/>
-          </a:solidFill>
-          <a:ln>
-            <a:solidFill>
-              <a:schemeClr val="bg1"/>
-            </a:solidFill>
-          </a:ln>
-        </p:spPr>
-        <p:style>
-          <a:lnRef idx="2">
-            <a:schemeClr val="accent1">
-              <a:shade val="15000"/>
-            </a:schemeClr>
-          </a:lnRef>
-          <a:fillRef idx="1">
-            <a:schemeClr val="accent1"/>
-          </a:fillRef>
-          <a:effectRef idx="0">
-            <a:schemeClr val="accent1"/>
-          </a:effectRef>
-          <a:fontRef idx="minor">
-            <a:schemeClr val="lt1"/>
-          </a:fontRef>
-        </p:style>
-        <p:txBody>
-          <a:bodyPr rtlCol="0" anchor="ctr"/>
-          <a:lstStyle/>
-          <a:p>
-            <a:pPr algn="ctr"/>
-            <a:endParaRPr lang="en-DK"/>
-          </a:p>
-        </p:txBody>
-      </p:sp>
     </p:spTree>
     <p:extLst>
       <p:ext uri="{BB962C8B-B14F-4D97-AF65-F5344CB8AC3E}">
@@ -11956,60 +11578,6 @@
           </a:prstGeom>
         </p:spPr>
       </p:pic>
-      <p:sp>
-        <p:nvSpPr>
-          <p:cNvPr id="6" name="Rectangle 5">
-            <a:extLst>
-              <a:ext uri="{FF2B5EF4-FFF2-40B4-BE49-F238E27FC236}">
-                <a16:creationId xmlns:a16="http://schemas.microsoft.com/office/drawing/2014/main" id="{BC4672A4-F341-0C26-59E4-7A1F3284A916}"/>
-              </a:ext>
-            </a:extLst>
-          </p:cNvPr>
-          <p:cNvSpPr/>
-          <p:nvPr/>
-        </p:nvSpPr>
-        <p:spPr>
-          <a:xfrm>
-            <a:off x="11645463" y="177351"/>
-            <a:ext cx="360000" cy="360000"/>
-          </a:xfrm>
-          <a:prstGeom prst="rect">
-            <a:avLst/>
-          </a:prstGeom>
-          <a:solidFill>
-            <a:schemeClr val="bg1"/>
-          </a:solidFill>
-          <a:ln>
-            <a:solidFill>
-              <a:schemeClr val="bg1"/>
-            </a:solidFill>
-          </a:ln>
-        </p:spPr>
-        <p:style>
-          <a:lnRef idx="2">
-            <a:schemeClr val="accent1">
-              <a:shade val="15000"/>
-            </a:schemeClr>
-          </a:lnRef>
-          <a:fillRef idx="1">
-            <a:schemeClr val="accent1"/>
-          </a:fillRef>
-          <a:effectRef idx="0">
-            <a:schemeClr val="accent1"/>
-          </a:effectRef>
-          <a:fontRef idx="minor">
-            <a:schemeClr val="lt1"/>
-          </a:fontRef>
-        </p:style>
-        <p:txBody>
-          <a:bodyPr rtlCol="0" anchor="ctr"/>
-          <a:lstStyle/>
-          <a:p>
-            <a:pPr algn="ctr"/>
-            <a:endParaRPr lang="en-DK"/>
-          </a:p>
-        </p:txBody>
-      </p:sp>
     </p:spTree>
     <p:extLst>
       <p:ext uri="{BB962C8B-B14F-4D97-AF65-F5344CB8AC3E}">
@@ -12183,60 +11751,6 @@
           </a:prstGeom>
         </p:spPr>
       </p:pic>
-      <p:sp>
-        <p:nvSpPr>
-          <p:cNvPr id="6" name="Rectangle 5">
-            <a:extLst>
-              <a:ext uri="{FF2B5EF4-FFF2-40B4-BE49-F238E27FC236}">
-                <a16:creationId xmlns:a16="http://schemas.microsoft.com/office/drawing/2014/main" id="{F0C4D061-229E-9995-7072-E781886A49A5}"/>
-              </a:ext>
-            </a:extLst>
-          </p:cNvPr>
-          <p:cNvSpPr/>
-          <p:nvPr/>
-        </p:nvSpPr>
-        <p:spPr>
-          <a:xfrm>
-            <a:off x="11645463" y="177351"/>
-            <a:ext cx="360000" cy="360000"/>
-          </a:xfrm>
-          <a:prstGeom prst="rect">
-            <a:avLst/>
-          </a:prstGeom>
-          <a:solidFill>
-            <a:schemeClr val="bg1"/>
-          </a:solidFill>
-          <a:ln>
-            <a:solidFill>
-              <a:schemeClr val="bg1"/>
-            </a:solidFill>
-          </a:ln>
-        </p:spPr>
-        <p:style>
-          <a:lnRef idx="2">
-            <a:schemeClr val="accent1">
-              <a:shade val="15000"/>
-            </a:schemeClr>
-          </a:lnRef>
-          <a:fillRef idx="1">
-            <a:schemeClr val="accent1"/>
-          </a:fillRef>
-          <a:effectRef idx="0">
-            <a:schemeClr val="accent1"/>
-          </a:effectRef>
-          <a:fontRef idx="minor">
-            <a:schemeClr val="lt1"/>
-          </a:fontRef>
-        </p:style>
-        <p:txBody>
-          <a:bodyPr rtlCol="0" anchor="ctr"/>
-          <a:lstStyle/>
-          <a:p>
-            <a:pPr algn="ctr"/>
-            <a:endParaRPr lang="en-DK"/>
-          </a:p>
-        </p:txBody>
-      </p:sp>
     </p:spTree>
     <p:extLst>
       <p:ext uri="{BB962C8B-B14F-4D97-AF65-F5344CB8AC3E}">
@@ -12372,60 +11886,6 @@
           <a:p>
             <a:pPr algn="ctr"/>
             <a:endParaRPr lang="en-DK" dirty="0"/>
-          </a:p>
-        </p:txBody>
-      </p:sp>
-      <p:sp>
-        <p:nvSpPr>
-          <p:cNvPr id="2" name="Rectangle 1">
-            <a:extLst>
-              <a:ext uri="{FF2B5EF4-FFF2-40B4-BE49-F238E27FC236}">
-                <a16:creationId xmlns:a16="http://schemas.microsoft.com/office/drawing/2014/main" id="{0715CDB6-56EA-7DB5-B3A3-9068961D9384}"/>
-              </a:ext>
-            </a:extLst>
-          </p:cNvPr>
-          <p:cNvSpPr/>
-          <p:nvPr/>
-        </p:nvSpPr>
-        <p:spPr>
-          <a:xfrm>
-            <a:off x="11645463" y="177351"/>
-            <a:ext cx="360000" cy="360000"/>
-          </a:xfrm>
-          <a:prstGeom prst="rect">
-            <a:avLst/>
-          </a:prstGeom>
-          <a:solidFill>
-            <a:schemeClr val="bg1"/>
-          </a:solidFill>
-          <a:ln>
-            <a:solidFill>
-              <a:schemeClr val="bg1"/>
-            </a:solidFill>
-          </a:ln>
-        </p:spPr>
-        <p:style>
-          <a:lnRef idx="2">
-            <a:schemeClr val="accent1">
-              <a:shade val="15000"/>
-            </a:schemeClr>
-          </a:lnRef>
-          <a:fillRef idx="1">
-            <a:schemeClr val="accent1"/>
-          </a:fillRef>
-          <a:effectRef idx="0">
-            <a:schemeClr val="accent1"/>
-          </a:effectRef>
-          <a:fontRef idx="minor">
-            <a:schemeClr val="lt1"/>
-          </a:fontRef>
-        </p:style>
-        <p:txBody>
-          <a:bodyPr rtlCol="0" anchor="ctr"/>
-          <a:lstStyle/>
-          <a:p>
-            <a:pPr algn="ctr"/>
-            <a:endParaRPr lang="en-DK"/>
           </a:p>
         </p:txBody>
       </p:sp>
@@ -12602,60 +12062,6 @@
           </a:p>
         </p:txBody>
       </p:sp>
-      <p:sp>
-        <p:nvSpPr>
-          <p:cNvPr id="2" name="Rectangle 1">
-            <a:extLst>
-              <a:ext uri="{FF2B5EF4-FFF2-40B4-BE49-F238E27FC236}">
-                <a16:creationId xmlns:a16="http://schemas.microsoft.com/office/drawing/2014/main" id="{0715CDB6-56EA-7DB5-B3A3-9068961D9384}"/>
-              </a:ext>
-            </a:extLst>
-          </p:cNvPr>
-          <p:cNvSpPr/>
-          <p:nvPr/>
-        </p:nvSpPr>
-        <p:spPr>
-          <a:xfrm>
-            <a:off x="11645463" y="177351"/>
-            <a:ext cx="360000" cy="360000"/>
-          </a:xfrm>
-          <a:prstGeom prst="rect">
-            <a:avLst/>
-          </a:prstGeom>
-          <a:solidFill>
-            <a:schemeClr val="bg1"/>
-          </a:solidFill>
-          <a:ln>
-            <a:solidFill>
-              <a:schemeClr val="bg1"/>
-            </a:solidFill>
-          </a:ln>
-        </p:spPr>
-        <p:style>
-          <a:lnRef idx="2">
-            <a:schemeClr val="accent1">
-              <a:shade val="15000"/>
-            </a:schemeClr>
-          </a:lnRef>
-          <a:fillRef idx="1">
-            <a:schemeClr val="accent1"/>
-          </a:fillRef>
-          <a:effectRef idx="0">
-            <a:schemeClr val="accent1"/>
-          </a:effectRef>
-          <a:fontRef idx="minor">
-            <a:schemeClr val="lt1"/>
-          </a:fontRef>
-        </p:style>
-        <p:txBody>
-          <a:bodyPr rtlCol="0" anchor="ctr"/>
-          <a:lstStyle/>
-          <a:p>
-            <a:pPr algn="ctr"/>
-            <a:endParaRPr lang="en-DK"/>
-          </a:p>
-        </p:txBody>
-      </p:sp>
       <p:pic>
         <p:nvPicPr>
           <p:cNvPr id="5" name="Picture 4" descr="A red blue and black gauge&#10;&#10;Description automatically generated">
@@ -12829,60 +12235,6 @@
           </a:p>
         </p:txBody>
       </p:sp>
-      <p:sp>
-        <p:nvSpPr>
-          <p:cNvPr id="2" name="Rectangle 1">
-            <a:extLst>
-              <a:ext uri="{FF2B5EF4-FFF2-40B4-BE49-F238E27FC236}">
-                <a16:creationId xmlns:a16="http://schemas.microsoft.com/office/drawing/2014/main" id="{0715CDB6-56EA-7DB5-B3A3-9068961D9384}"/>
-              </a:ext>
-            </a:extLst>
-          </p:cNvPr>
-          <p:cNvSpPr/>
-          <p:nvPr/>
-        </p:nvSpPr>
-        <p:spPr>
-          <a:xfrm>
-            <a:off x="11645463" y="177351"/>
-            <a:ext cx="360000" cy="360000"/>
-          </a:xfrm>
-          <a:prstGeom prst="rect">
-            <a:avLst/>
-          </a:prstGeom>
-          <a:solidFill>
-            <a:schemeClr val="bg1"/>
-          </a:solidFill>
-          <a:ln>
-            <a:solidFill>
-              <a:schemeClr val="bg1"/>
-            </a:solidFill>
-          </a:ln>
-        </p:spPr>
-        <p:style>
-          <a:lnRef idx="2">
-            <a:schemeClr val="accent1">
-              <a:shade val="15000"/>
-            </a:schemeClr>
-          </a:lnRef>
-          <a:fillRef idx="1">
-            <a:schemeClr val="accent1"/>
-          </a:fillRef>
-          <a:effectRef idx="0">
-            <a:schemeClr val="accent1"/>
-          </a:effectRef>
-          <a:fontRef idx="minor">
-            <a:schemeClr val="lt1"/>
-          </a:fontRef>
-        </p:style>
-        <p:txBody>
-          <a:bodyPr rtlCol="0" anchor="ctr"/>
-          <a:lstStyle/>
-          <a:p>
-            <a:pPr algn="ctr"/>
-            <a:endParaRPr lang="en-DK"/>
-          </a:p>
-        </p:txBody>
-      </p:sp>
       <p:pic>
         <p:nvPicPr>
           <p:cNvPr id="5" name="Picture 4" descr="A red white and blue speedometer&#10;&#10;Description automatically generated">
@@ -13056,60 +12408,6 @@
           </a:p>
         </p:txBody>
       </p:sp>
-      <p:sp>
-        <p:nvSpPr>
-          <p:cNvPr id="2" name="Rectangle 1">
-            <a:extLst>
-              <a:ext uri="{FF2B5EF4-FFF2-40B4-BE49-F238E27FC236}">
-                <a16:creationId xmlns:a16="http://schemas.microsoft.com/office/drawing/2014/main" id="{0715CDB6-56EA-7DB5-B3A3-9068961D9384}"/>
-              </a:ext>
-            </a:extLst>
-          </p:cNvPr>
-          <p:cNvSpPr/>
-          <p:nvPr/>
-        </p:nvSpPr>
-        <p:spPr>
-          <a:xfrm>
-            <a:off x="11645463" y="177351"/>
-            <a:ext cx="360000" cy="360000"/>
-          </a:xfrm>
-          <a:prstGeom prst="rect">
-            <a:avLst/>
-          </a:prstGeom>
-          <a:solidFill>
-            <a:schemeClr val="bg1"/>
-          </a:solidFill>
-          <a:ln>
-            <a:solidFill>
-              <a:schemeClr val="bg1"/>
-            </a:solidFill>
-          </a:ln>
-        </p:spPr>
-        <p:style>
-          <a:lnRef idx="2">
-            <a:schemeClr val="accent1">
-              <a:shade val="15000"/>
-            </a:schemeClr>
-          </a:lnRef>
-          <a:fillRef idx="1">
-            <a:schemeClr val="accent1"/>
-          </a:fillRef>
-          <a:effectRef idx="0">
-            <a:schemeClr val="accent1"/>
-          </a:effectRef>
-          <a:fontRef idx="minor">
-            <a:schemeClr val="lt1"/>
-          </a:fontRef>
-        </p:style>
-        <p:txBody>
-          <a:bodyPr rtlCol="0" anchor="ctr"/>
-          <a:lstStyle/>
-          <a:p>
-            <a:pPr algn="ctr"/>
-            <a:endParaRPr lang="en-DK"/>
-          </a:p>
-        </p:txBody>
-      </p:sp>
       <p:pic>
         <p:nvPicPr>
           <p:cNvPr id="5" name="Picture 4" descr="A red white and blue arrow pointing to a speedometer&#10;&#10;Description automatically generated">
@@ -13283,60 +12581,6 @@
           </a:p>
         </p:txBody>
       </p:sp>
-      <p:sp>
-        <p:nvSpPr>
-          <p:cNvPr id="2" name="Rectangle 1">
-            <a:extLst>
-              <a:ext uri="{FF2B5EF4-FFF2-40B4-BE49-F238E27FC236}">
-                <a16:creationId xmlns:a16="http://schemas.microsoft.com/office/drawing/2014/main" id="{0715CDB6-56EA-7DB5-B3A3-9068961D9384}"/>
-              </a:ext>
-            </a:extLst>
-          </p:cNvPr>
-          <p:cNvSpPr/>
-          <p:nvPr/>
-        </p:nvSpPr>
-        <p:spPr>
-          <a:xfrm>
-            <a:off x="11645463" y="177351"/>
-            <a:ext cx="360000" cy="360000"/>
-          </a:xfrm>
-          <a:prstGeom prst="rect">
-            <a:avLst/>
-          </a:prstGeom>
-          <a:solidFill>
-            <a:schemeClr val="bg1"/>
-          </a:solidFill>
-          <a:ln>
-            <a:solidFill>
-              <a:schemeClr val="bg1"/>
-            </a:solidFill>
-          </a:ln>
-        </p:spPr>
-        <p:style>
-          <a:lnRef idx="2">
-            <a:schemeClr val="accent1">
-              <a:shade val="15000"/>
-            </a:schemeClr>
-          </a:lnRef>
-          <a:fillRef idx="1">
-            <a:schemeClr val="accent1"/>
-          </a:fillRef>
-          <a:effectRef idx="0">
-            <a:schemeClr val="accent1"/>
-          </a:effectRef>
-          <a:fontRef idx="minor">
-            <a:schemeClr val="lt1"/>
-          </a:fontRef>
-        </p:style>
-        <p:txBody>
-          <a:bodyPr rtlCol="0" anchor="ctr"/>
-          <a:lstStyle/>
-          <a:p>
-            <a:pPr algn="ctr"/>
-            <a:endParaRPr lang="en-DK"/>
-          </a:p>
-        </p:txBody>
-      </p:sp>
       <p:pic>
         <p:nvPicPr>
           <p:cNvPr id="5" name="Picture 4" descr="A red and blue arrow pointing up&#10;&#10;Description automatically generated">
@@ -13510,60 +12754,6 @@
           </a:p>
         </p:txBody>
       </p:sp>
-      <p:sp>
-        <p:nvSpPr>
-          <p:cNvPr id="2" name="Rectangle 1">
-            <a:extLst>
-              <a:ext uri="{FF2B5EF4-FFF2-40B4-BE49-F238E27FC236}">
-                <a16:creationId xmlns:a16="http://schemas.microsoft.com/office/drawing/2014/main" id="{0715CDB6-56EA-7DB5-B3A3-9068961D9384}"/>
-              </a:ext>
-            </a:extLst>
-          </p:cNvPr>
-          <p:cNvSpPr/>
-          <p:nvPr/>
-        </p:nvSpPr>
-        <p:spPr>
-          <a:xfrm>
-            <a:off x="11645463" y="177351"/>
-            <a:ext cx="360000" cy="360000"/>
-          </a:xfrm>
-          <a:prstGeom prst="rect">
-            <a:avLst/>
-          </a:prstGeom>
-          <a:solidFill>
-            <a:schemeClr val="bg1"/>
-          </a:solidFill>
-          <a:ln>
-            <a:solidFill>
-              <a:schemeClr val="bg1"/>
-            </a:solidFill>
-          </a:ln>
-        </p:spPr>
-        <p:style>
-          <a:lnRef idx="2">
-            <a:schemeClr val="accent1">
-              <a:shade val="15000"/>
-            </a:schemeClr>
-          </a:lnRef>
-          <a:fillRef idx="1">
-            <a:schemeClr val="accent1"/>
-          </a:fillRef>
-          <a:effectRef idx="0">
-            <a:schemeClr val="accent1"/>
-          </a:effectRef>
-          <a:fontRef idx="minor">
-            <a:schemeClr val="lt1"/>
-          </a:fontRef>
-        </p:style>
-        <p:txBody>
-          <a:bodyPr rtlCol="0" anchor="ctr"/>
-          <a:lstStyle/>
-          <a:p>
-            <a:pPr algn="ctr"/>
-            <a:endParaRPr lang="en-DK"/>
-          </a:p>
-        </p:txBody>
-      </p:sp>
       <p:pic>
         <p:nvPicPr>
           <p:cNvPr id="5" name="Picture 4" descr="A red and blue speedometer with arrow&#10;&#10;Description automatically generated">
@@ -13734,60 +12924,6 @@
           <a:p>
             <a:pPr algn="ctr"/>
             <a:endParaRPr lang="en-DK" dirty="0"/>
-          </a:p>
-        </p:txBody>
-      </p:sp>
-      <p:sp>
-        <p:nvSpPr>
-          <p:cNvPr id="2" name="Rectangle 1">
-            <a:extLst>
-              <a:ext uri="{FF2B5EF4-FFF2-40B4-BE49-F238E27FC236}">
-                <a16:creationId xmlns:a16="http://schemas.microsoft.com/office/drawing/2014/main" id="{0715CDB6-56EA-7DB5-B3A3-9068961D9384}"/>
-              </a:ext>
-            </a:extLst>
-          </p:cNvPr>
-          <p:cNvSpPr/>
-          <p:nvPr/>
-        </p:nvSpPr>
-        <p:spPr>
-          <a:xfrm>
-            <a:off x="11645463" y="177351"/>
-            <a:ext cx="360000" cy="360000"/>
-          </a:xfrm>
-          <a:prstGeom prst="rect">
-            <a:avLst/>
-          </a:prstGeom>
-          <a:solidFill>
-            <a:schemeClr val="bg1"/>
-          </a:solidFill>
-          <a:ln>
-            <a:solidFill>
-              <a:schemeClr val="bg1"/>
-            </a:solidFill>
-          </a:ln>
-        </p:spPr>
-        <p:style>
-          <a:lnRef idx="2">
-            <a:schemeClr val="accent1">
-              <a:shade val="15000"/>
-            </a:schemeClr>
-          </a:lnRef>
-          <a:fillRef idx="1">
-            <a:schemeClr val="accent1"/>
-          </a:fillRef>
-          <a:effectRef idx="0">
-            <a:schemeClr val="accent1"/>
-          </a:effectRef>
-          <a:fontRef idx="minor">
-            <a:schemeClr val="lt1"/>
-          </a:fontRef>
-        </p:style>
-        <p:txBody>
-          <a:bodyPr rtlCol="0" anchor="ctr"/>
-          <a:lstStyle/>
-          <a:p>
-            <a:pPr algn="ctr"/>
-            <a:endParaRPr lang="en-DK"/>
           </a:p>
         </p:txBody>
       </p:sp>
@@ -14430,6 +13566,15 @@
 </file>
 
 <file path=customXml/item1.xml><?xml version="1.0" encoding="utf-8"?>
+<?mso-contentType ?>
+<FormTemplates xmlns="http://schemas.microsoft.com/sharepoint/v3/contenttype/forms">
+  <Display>DocumentLibraryForm</Display>
+  <Edit>DocumentLibraryForm</Edit>
+  <New>DocumentLibraryForm</New>
+</FormTemplates>
+</file>
+
+<file path=customXml/item2.xml><?xml version="1.0" encoding="utf-8"?>
 <ct:contentTypeSchema xmlns:ct="http://schemas.microsoft.com/office/2006/metadata/contentType" xmlns:ma="http://schemas.microsoft.com/office/2006/metadata/properties/metaAttributes" ct:_="" ma:_="" ma:contentTypeName="Document" ma:contentTypeID="0x0101005B996248A2D0E04D87B9DBB54D269DA4" ma:contentTypeVersion="17" ma:contentTypeDescription="Create a new document." ma:contentTypeScope="" ma:versionID="ccde82052730f3953ccb22e595f11d68">
   <xsd:schema xmlns:xsd="http://www.w3.org/2001/XMLSchema" xmlns:xs="http://www.w3.org/2001/XMLSchema" xmlns:p="http://schemas.microsoft.com/office/2006/metadata/properties" xmlns:ns2="51c7d8ad-74c8-4833-8478-0d0a5cafce0c" xmlns:ns3="6dfb7b4b-871d-4c24-9d42-16b14ecd044c" targetNamespace="http://schemas.microsoft.com/office/2006/metadata/properties" ma:root="true" ma:fieldsID="cdfcea1928cd178ac0427a8aa8ed82fa" ns2:_="" ns3:_="">
     <xsd:import namespace="51c7d8ad-74c8-4833-8478-0d0a5cafce0c"/>
@@ -14678,16 +13823,15 @@
 </ct:contentTypeSchema>
 </file>
 
-<file path=customXml/item2.xml><?xml version="1.0" encoding="utf-8"?>
-<?mso-contentType ?>
-<FormTemplates xmlns="http://schemas.microsoft.com/sharepoint/v3/contenttype/forms">
-  <Display>DocumentLibraryForm</Display>
-  <Edit>DocumentLibraryForm</Edit>
-  <New>DocumentLibraryForm</New>
-</FormTemplates>
+<file path=customXml/itemProps1.xml><?xml version="1.0" encoding="utf-8"?>
+<ds:datastoreItem xmlns:ds="http://schemas.openxmlformats.org/officeDocument/2006/customXml" ds:itemID="{F60A0FA9-53AC-454F-9DB0-1312247196FB}">
+  <ds:schemaRefs>
+    <ds:schemaRef ds:uri="http://schemas.microsoft.com/sharepoint/v3/contenttype/forms"/>
+  </ds:schemaRefs>
+</ds:datastoreItem>
 </file>
 
-<file path=customXml/itemProps1.xml><?xml version="1.0" encoding="utf-8"?>
+<file path=customXml/itemProps2.xml><?xml version="1.0" encoding="utf-8"?>
 <ds:datastoreItem xmlns:ds="http://schemas.openxmlformats.org/officeDocument/2006/customXml" ds:itemID="{45414D3F-B1C5-403E-BB47-0DA0186A25FD}">
   <ds:schemaRefs>
     <ds:schemaRef ds:uri="http://schemas.microsoft.com/office/2006/metadata/contentType"/>
@@ -14704,12 +13848,4 @@
     <ds:schemaRef ds:uri="http://schemas.microsoft.com/internal/obd"/>
   </ds:schemaRefs>
 </ds:datastoreItem>
-</file>
-
-<file path=customXml/itemProps2.xml><?xml version="1.0" encoding="utf-8"?>
-<ds:datastoreItem xmlns:ds="http://schemas.openxmlformats.org/officeDocument/2006/customXml" ds:itemID="{F60A0FA9-53AC-454F-9DB0-1312247196FB}">
-  <ds:schemaRefs>
-    <ds:schemaRef ds:uri="http://schemas.microsoft.com/sharepoint/v3/contenttype/forms"/>
-  </ds:schemaRefs>
-</ds:datastoreItem>
 </file>
</xml_diff>